<commit_message>
initial commit of foundation lessons
</commit_message>
<xml_diff>
--- a/01_FoundationProjects/CFL01_LED_OLED/CFL01_LED_OLED.pptx
+++ b/01_FoundationProjects/CFL01_LED_OLED/CFL01_LED_OLED.pptx
@@ -202,7 +202,7 @@
           <a:p>
             <a:fld id="{393FEA32-2B8B-4244-A536-214CF6D4B9AB}" type="datetimeFigureOut">
               <a:rPr lang="en-GB" smtClean="0"/>
-              <a:t>04/01/2026</a:t>
+              <a:t>07/01/2026</a:t>
             </a:fld>
             <a:endParaRPr lang="en-GB"/>
           </a:p>
@@ -5583,6 +5583,42 @@
           </a:p>
         </p:txBody>
       </p:sp>
+      <p:pic>
+        <p:nvPicPr>
+          <p:cNvPr id="7" name="Picture 6">
+            <a:extLst>
+              <a:ext uri="{FF2B5EF4-FFF2-40B4-BE49-F238E27FC236}">
+                <a16:creationId xmlns:a16="http://schemas.microsoft.com/office/drawing/2014/main" id="{744B1328-5FE3-A9D6-3ADB-506EF6FD5EB0}"/>
+              </a:ext>
+            </a:extLst>
+          </p:cNvPr>
+          <p:cNvPicPr>
+            <a:picLocks noChangeAspect="1"/>
+          </p:cNvPicPr>
+          <p:nvPr/>
+        </p:nvPicPr>
+        <p:blipFill>
+          <a:blip r:embed="rId4" cstate="print">
+            <a:extLst>
+              <a:ext uri="{28A0092B-C50C-407E-A947-70E740481C1C}">
+                <a14:useLocalDpi xmlns:a14="http://schemas.microsoft.com/office/drawing/2010/main" val="0"/>
+              </a:ext>
+            </a:extLst>
+          </a:blip>
+          <a:stretch>
+            <a:fillRect/>
+          </a:stretch>
+        </p:blipFill>
+        <p:spPr>
+          <a:xfrm>
+            <a:off x="9004852" y="1"/>
+            <a:ext cx="3125372" cy="842386"/>
+          </a:xfrm>
+          <a:prstGeom prst="rect">
+            <a:avLst/>
+          </a:prstGeom>
+        </p:spPr>
+      </p:pic>
     </p:spTree>
   </p:cSld>
   <p:clrMapOvr>
@@ -6366,7 +6402,7 @@
         <p:spPr>
           <a:xfrm>
             <a:off x="1038023" y="3846683"/>
-            <a:ext cx="4885191" cy="307777"/>
+            <a:ext cx="4885191" cy="954107"/>
           </a:xfrm>
           <a:prstGeom prst="rect">
             <a:avLst/>
@@ -6477,6 +6513,15 @@
               </a:defRPr>
             </a:lvl9pPr>
           </a:lstStyle>
+          <a:p>
+            <a:r>
+              <a:rPr lang="en-GB" dirty="0">
+                <a:hlinkClick r:id="rId4"/>
+              </a:rPr>
+              <a:t>https://github.com/info-zas/zas-robotics-communications/blob/main/01_FoundationProjects/CFL01_LED_OLED/CFL01_LED_Blink/CFL01_LED_Blink.ino</a:t>
+            </a:r>
+            <a:endParaRPr lang="en-GB" dirty="0"/>
+          </a:p>
           <a:p>
             <a:endParaRPr lang="en-GB" dirty="0"/>
           </a:p>
@@ -7127,7 +7172,7 @@
         <p:spPr>
           <a:xfrm>
             <a:off x="722163" y="5511604"/>
-            <a:ext cx="4885191" cy="307777"/>
+            <a:ext cx="4885191" cy="954107"/>
           </a:xfrm>
           <a:prstGeom prst="rect">
             <a:avLst/>
@@ -7239,6 +7284,15 @@
             </a:lvl9pPr>
           </a:lstStyle>
           <a:p>
+            <a:r>
+              <a:rPr lang="en-GB" dirty="0">
+                <a:hlinkClick r:id="rId2"/>
+              </a:rPr>
+              <a:t>https://github.com/info-zas/zas-robotics-communications/blob/main/01_FoundationProjects/CFL01_LED_OLED/CFL01_LED_OLED/CFL01_LED_OLED.ino</a:t>
+            </a:r>
+            <a:endParaRPr lang="en-GB" dirty="0"/>
+          </a:p>
+          <a:p>
             <a:endParaRPr lang="en-GB" dirty="0"/>
           </a:p>
         </p:txBody>
@@ -7258,7 +7312,7 @@
           <p:nvPr/>
         </p:nvPicPr>
         <p:blipFill>
-          <a:blip r:embed="rId2"/>
+          <a:blip r:embed="rId3"/>
           <a:stretch>
             <a:fillRect/>
           </a:stretch>
@@ -7516,6 +7570,42 @@
           </a:p>
         </p:txBody>
       </p:sp>
+      <p:pic>
+        <p:nvPicPr>
+          <p:cNvPr id="8" name="Picture 7">
+            <a:extLst>
+              <a:ext uri="{FF2B5EF4-FFF2-40B4-BE49-F238E27FC236}">
+                <a16:creationId xmlns:a16="http://schemas.microsoft.com/office/drawing/2014/main" id="{2AEE9D2D-9E51-5025-C2D5-DFDAB50306C9}"/>
+              </a:ext>
+            </a:extLst>
+          </p:cNvPr>
+          <p:cNvPicPr>
+            <a:picLocks noChangeAspect="1"/>
+          </p:cNvPicPr>
+          <p:nvPr/>
+        </p:nvPicPr>
+        <p:blipFill>
+          <a:blip r:embed="rId4" cstate="print">
+            <a:extLst>
+              <a:ext uri="{28A0092B-C50C-407E-A947-70E740481C1C}">
+                <a14:useLocalDpi xmlns:a14="http://schemas.microsoft.com/office/drawing/2010/main" val="0"/>
+              </a:ext>
+            </a:extLst>
+          </a:blip>
+          <a:stretch>
+            <a:fillRect/>
+          </a:stretch>
+        </p:blipFill>
+        <p:spPr>
+          <a:xfrm>
+            <a:off x="9004852" y="1"/>
+            <a:ext cx="3125372" cy="842386"/>
+          </a:xfrm>
+          <a:prstGeom prst="rect">
+            <a:avLst/>
+          </a:prstGeom>
+        </p:spPr>
+      </p:pic>
     </p:spTree>
     <p:extLst>
       <p:ext uri="{BB962C8B-B14F-4D97-AF65-F5344CB8AC3E}">

</xml_diff>